<commit_message>
chapter contents are now is [chapter].json instead of [chapter]/1.json
</commit_message>
<xml_diff>
--- a/titles.pptx
+++ b/titles.pptx
@@ -262,7 +262,7 @@
           <a:p>
             <a:fld id="{8A5A131E-1AD7-49B3-A091-4E8FE3539C49}" type="datetimeFigureOut">
               <a:rPr lang="en-US" smtClean="0"/>
-              <a:t>6/13/2024</a:t>
+              <a:t>6/18/2024</a:t>
             </a:fld>
             <a:endParaRPr lang="en-US"/>
           </a:p>
@@ -460,7 +460,7 @@
           <a:p>
             <a:fld id="{8A5A131E-1AD7-49B3-A091-4E8FE3539C49}" type="datetimeFigureOut">
               <a:rPr lang="en-US" smtClean="0"/>
-              <a:t>6/13/2024</a:t>
+              <a:t>6/18/2024</a:t>
             </a:fld>
             <a:endParaRPr lang="en-US"/>
           </a:p>
@@ -668,7 +668,7 @@
           <a:p>
             <a:fld id="{8A5A131E-1AD7-49B3-A091-4E8FE3539C49}" type="datetimeFigureOut">
               <a:rPr lang="en-US" smtClean="0"/>
-              <a:t>6/13/2024</a:t>
+              <a:t>6/18/2024</a:t>
             </a:fld>
             <a:endParaRPr lang="en-US"/>
           </a:p>
@@ -866,7 +866,7 @@
           <a:p>
             <a:fld id="{8A5A131E-1AD7-49B3-A091-4E8FE3539C49}" type="datetimeFigureOut">
               <a:rPr lang="en-US" smtClean="0"/>
-              <a:t>6/13/2024</a:t>
+              <a:t>6/18/2024</a:t>
             </a:fld>
             <a:endParaRPr lang="en-US"/>
           </a:p>
@@ -1141,7 +1141,7 @@
           <a:p>
             <a:fld id="{8A5A131E-1AD7-49B3-A091-4E8FE3539C49}" type="datetimeFigureOut">
               <a:rPr lang="en-US" smtClean="0"/>
-              <a:t>6/13/2024</a:t>
+              <a:t>6/18/2024</a:t>
             </a:fld>
             <a:endParaRPr lang="en-US"/>
           </a:p>
@@ -1406,7 +1406,7 @@
           <a:p>
             <a:fld id="{8A5A131E-1AD7-49B3-A091-4E8FE3539C49}" type="datetimeFigureOut">
               <a:rPr lang="en-US" smtClean="0"/>
-              <a:t>6/13/2024</a:t>
+              <a:t>6/18/2024</a:t>
             </a:fld>
             <a:endParaRPr lang="en-US"/>
           </a:p>
@@ -1818,7 +1818,7 @@
           <a:p>
             <a:fld id="{8A5A131E-1AD7-49B3-A091-4E8FE3539C49}" type="datetimeFigureOut">
               <a:rPr lang="en-US" smtClean="0"/>
-              <a:t>6/13/2024</a:t>
+              <a:t>6/18/2024</a:t>
             </a:fld>
             <a:endParaRPr lang="en-US"/>
           </a:p>
@@ -1959,7 +1959,7 @@
           <a:p>
             <a:fld id="{8A5A131E-1AD7-49B3-A091-4E8FE3539C49}" type="datetimeFigureOut">
               <a:rPr lang="en-US" smtClean="0"/>
-              <a:t>6/13/2024</a:t>
+              <a:t>6/18/2024</a:t>
             </a:fld>
             <a:endParaRPr lang="en-US"/>
           </a:p>
@@ -2072,7 +2072,7 @@
           <a:p>
             <a:fld id="{8A5A131E-1AD7-49B3-A091-4E8FE3539C49}" type="datetimeFigureOut">
               <a:rPr lang="en-US" smtClean="0"/>
-              <a:t>6/13/2024</a:t>
+              <a:t>6/18/2024</a:t>
             </a:fld>
             <a:endParaRPr lang="en-US"/>
           </a:p>
@@ -2383,7 +2383,7 @@
           <a:p>
             <a:fld id="{8A5A131E-1AD7-49B3-A091-4E8FE3539C49}" type="datetimeFigureOut">
               <a:rPr lang="en-US" smtClean="0"/>
-              <a:t>6/13/2024</a:t>
+              <a:t>6/18/2024</a:t>
             </a:fld>
             <a:endParaRPr lang="en-US"/>
           </a:p>
@@ -2671,7 +2671,7 @@
           <a:p>
             <a:fld id="{8A5A131E-1AD7-49B3-A091-4E8FE3539C49}" type="datetimeFigureOut">
               <a:rPr lang="en-US" smtClean="0"/>
-              <a:t>6/13/2024</a:t>
+              <a:t>6/18/2024</a:t>
             </a:fld>
             <a:endParaRPr lang="en-US"/>
           </a:p>
@@ -2912,7 +2912,7 @@
           <a:p>
             <a:fld id="{8A5A131E-1AD7-49B3-A091-4E8FE3539C49}" type="datetimeFigureOut">
               <a:rPr lang="en-US" smtClean="0"/>
-              <a:t>6/13/2024</a:t>
+              <a:t>6/18/2024</a:t>
             </a:fld>
             <a:endParaRPr lang="en-US"/>
           </a:p>

</xml_diff>

<commit_message>
added image for Number Theory (part 2) and edited Eulers_Theorem.json
</commit_message>
<xml_diff>
--- a/titles.pptx
+++ b/titles.pptx
@@ -262,7 +262,7 @@
           <a:p>
             <a:fld id="{8A5A131E-1AD7-49B3-A091-4E8FE3539C49}" type="datetimeFigureOut">
               <a:rPr lang="en-US" smtClean="0"/>
-              <a:t>6/18/2024</a:t>
+              <a:t>3/7/2025</a:t>
             </a:fld>
             <a:endParaRPr lang="en-US"/>
           </a:p>
@@ -460,7 +460,7 @@
           <a:p>
             <a:fld id="{8A5A131E-1AD7-49B3-A091-4E8FE3539C49}" type="datetimeFigureOut">
               <a:rPr lang="en-US" smtClean="0"/>
-              <a:t>6/18/2024</a:t>
+              <a:t>3/7/2025</a:t>
             </a:fld>
             <a:endParaRPr lang="en-US"/>
           </a:p>
@@ -668,7 +668,7 @@
           <a:p>
             <a:fld id="{8A5A131E-1AD7-49B3-A091-4E8FE3539C49}" type="datetimeFigureOut">
               <a:rPr lang="en-US" smtClean="0"/>
-              <a:t>6/18/2024</a:t>
+              <a:t>3/7/2025</a:t>
             </a:fld>
             <a:endParaRPr lang="en-US"/>
           </a:p>
@@ -866,7 +866,7 @@
           <a:p>
             <a:fld id="{8A5A131E-1AD7-49B3-A091-4E8FE3539C49}" type="datetimeFigureOut">
               <a:rPr lang="en-US" smtClean="0"/>
-              <a:t>6/18/2024</a:t>
+              <a:t>3/7/2025</a:t>
             </a:fld>
             <a:endParaRPr lang="en-US"/>
           </a:p>
@@ -1141,7 +1141,7 @@
           <a:p>
             <a:fld id="{8A5A131E-1AD7-49B3-A091-4E8FE3539C49}" type="datetimeFigureOut">
               <a:rPr lang="en-US" smtClean="0"/>
-              <a:t>6/18/2024</a:t>
+              <a:t>3/7/2025</a:t>
             </a:fld>
             <a:endParaRPr lang="en-US"/>
           </a:p>
@@ -1406,7 +1406,7 @@
           <a:p>
             <a:fld id="{8A5A131E-1AD7-49B3-A091-4E8FE3539C49}" type="datetimeFigureOut">
               <a:rPr lang="en-US" smtClean="0"/>
-              <a:t>6/18/2024</a:t>
+              <a:t>3/7/2025</a:t>
             </a:fld>
             <a:endParaRPr lang="en-US"/>
           </a:p>
@@ -1818,7 +1818,7 @@
           <a:p>
             <a:fld id="{8A5A131E-1AD7-49B3-A091-4E8FE3539C49}" type="datetimeFigureOut">
               <a:rPr lang="en-US" smtClean="0"/>
-              <a:t>6/18/2024</a:t>
+              <a:t>3/7/2025</a:t>
             </a:fld>
             <a:endParaRPr lang="en-US"/>
           </a:p>
@@ -1959,7 +1959,7 @@
           <a:p>
             <a:fld id="{8A5A131E-1AD7-49B3-A091-4E8FE3539C49}" type="datetimeFigureOut">
               <a:rPr lang="en-US" smtClean="0"/>
-              <a:t>6/18/2024</a:t>
+              <a:t>3/7/2025</a:t>
             </a:fld>
             <a:endParaRPr lang="en-US"/>
           </a:p>
@@ -2072,7 +2072,7 @@
           <a:p>
             <a:fld id="{8A5A131E-1AD7-49B3-A091-4E8FE3539C49}" type="datetimeFigureOut">
               <a:rPr lang="en-US" smtClean="0"/>
-              <a:t>6/18/2024</a:t>
+              <a:t>3/7/2025</a:t>
             </a:fld>
             <a:endParaRPr lang="en-US"/>
           </a:p>
@@ -2383,7 +2383,7 @@
           <a:p>
             <a:fld id="{8A5A131E-1AD7-49B3-A091-4E8FE3539C49}" type="datetimeFigureOut">
               <a:rPr lang="en-US" smtClean="0"/>
-              <a:t>6/18/2024</a:t>
+              <a:t>3/7/2025</a:t>
             </a:fld>
             <a:endParaRPr lang="en-US"/>
           </a:p>
@@ -2671,7 +2671,7 @@
           <a:p>
             <a:fld id="{8A5A131E-1AD7-49B3-A091-4E8FE3539C49}" type="datetimeFigureOut">
               <a:rPr lang="en-US" smtClean="0"/>
-              <a:t>6/18/2024</a:t>
+              <a:t>3/7/2025</a:t>
             </a:fld>
             <a:endParaRPr lang="en-US"/>
           </a:p>
@@ -2912,7 +2912,7 @@
           <a:p>
             <a:fld id="{8A5A131E-1AD7-49B3-A091-4E8FE3539C49}" type="datetimeFigureOut">
               <a:rPr lang="en-US" smtClean="0"/>
-              <a:t>6/18/2024</a:t>
+              <a:t>3/7/2025</a:t>
             </a:fld>
             <a:endParaRPr lang="en-US"/>
           </a:p>
@@ -3490,7 +3490,7 @@
                 </a:pattFill>
                 <a:latin typeface="Acme" panose="02000706050000020004" pitchFamily="2" charset="0"/>
               </a:rPr>
-              <a:t>THEORY</a:t>
+              <a:t>THEORY 2</a:t>
             </a:r>
           </a:p>
         </p:txBody>

</xml_diff>